<commit_message>
[poster] we hate you dirk
</commit_message>
<xml_diff>
--- a/poster/CS 228 Poster Presentation.pptx
+++ b/poster/CS 228 Poster Presentation.pptx
@@ -11,8 +11,9 @@
     <p:sldId id="263" r:id="rId5"/>
     <p:sldId id="257" r:id="rId6"/>
     <p:sldId id="259" r:id="rId7"/>
-    <p:sldId id="258" r:id="rId8"/>
-    <p:sldId id="264" r:id="rId9"/>
+    <p:sldId id="264" r:id="rId8"/>
+    <p:sldId id="265" r:id="rId9"/>
+    <p:sldId id="258" r:id="rId10"/>
   </p:sldIdLst>
   <p:sldSz cx="9144000" cy="6858000" type="screen4x3"/>
   <p:notesSz cx="6858000" cy="9144000"/>
@@ -14452,7 +14453,15 @@
           <a:p>
             <a:r>
               <a:rPr lang="en-US" b="1" dirty="0" smtClean="0"/>
-              <a:t>Case Study</a:t>
+              <a:t>Case </a:t>
+            </a:r>
+            <a:r>
+              <a:rPr lang="en-US" b="1" dirty="0" smtClean="0"/>
+              <a:t>Study: One </a:t>
+            </a:r>
+            <a:r>
+              <a:rPr lang="en-US" b="1" dirty="0" smtClean="0"/>
+              <a:t>Game</a:t>
             </a:r>
             <a:endParaRPr lang="en-US" b="1" dirty="0"/>
           </a:p>
@@ -14514,287 +14523,6 @@
       </p:grpSpPr>
       <p:sp>
         <p:nvSpPr>
-          <p:cNvPr id="5" name="Text Placeholder 4"/>
-          <p:cNvSpPr>
-            <a:spLocks noGrp="1"/>
-          </p:cNvSpPr>
-          <p:nvPr>
-            <p:ph type="body" idx="1"/>
-          </p:nvPr>
-        </p:nvSpPr>
-        <p:spPr>
-          <a:xfrm>
-            <a:off x="457202" y="528143"/>
-            <a:ext cx="4040188" cy="639762"/>
-          </a:xfrm>
-        </p:spPr>
-        <p:txBody>
-          <a:bodyPr/>
-          <a:lstStyle/>
-          <a:p>
-            <a:r>
-              <a:rPr lang="en-US" sz="2400" dirty="0" smtClean="0"/>
-              <a:t>Future Work</a:t>
-            </a:r>
-            <a:endParaRPr lang="en-US" sz="2400" dirty="0"/>
-          </a:p>
-        </p:txBody>
-      </p:sp>
-      <p:sp>
-        <p:nvSpPr>
-          <p:cNvPr id="6" name="Content Placeholder 5"/>
-          <p:cNvSpPr>
-            <a:spLocks noGrp="1"/>
-          </p:cNvSpPr>
-          <p:nvPr>
-            <p:ph sz="half" idx="2"/>
-          </p:nvPr>
-        </p:nvSpPr>
-        <p:spPr>
-          <a:xfrm>
-            <a:off x="457202" y="1167906"/>
-            <a:ext cx="4040188" cy="4958258"/>
-          </a:xfrm>
-        </p:spPr>
-        <p:txBody>
-          <a:bodyPr>
-            <a:normAutofit/>
-          </a:bodyPr>
-          <a:lstStyle/>
-          <a:p>
-            <a:r>
-              <a:rPr lang="en-US" dirty="0" smtClean="0"/>
-              <a:t>Smoothing/Bayesian Prior</a:t>
-            </a:r>
-          </a:p>
-          <a:p>
-            <a:r>
-              <a:rPr lang="en-US" dirty="0" smtClean="0"/>
-              <a:t>Coach Skill</a:t>
-            </a:r>
-          </a:p>
-          <a:p>
-            <a:r>
-              <a:rPr lang="en-US" dirty="0" smtClean="0"/>
-              <a:t>Even More Data</a:t>
-            </a:r>
-          </a:p>
-          <a:p>
-            <a:pPr>
-              <a:buNone/>
-            </a:pPr>
-            <a:endParaRPr lang="en-US" dirty="0" smtClean="0"/>
-          </a:p>
-          <a:p>
-            <a:endParaRPr lang="en-US" dirty="0" smtClean="0"/>
-          </a:p>
-        </p:txBody>
-      </p:sp>
-      <p:sp>
-        <p:nvSpPr>
-          <p:cNvPr id="7" name="Text Placeholder 6"/>
-          <p:cNvSpPr>
-            <a:spLocks noGrp="1"/>
-          </p:cNvSpPr>
-          <p:nvPr>
-            <p:ph type="body" sz="quarter" idx="3"/>
-          </p:nvPr>
-        </p:nvSpPr>
-        <p:spPr>
-          <a:xfrm>
-            <a:off x="4645027" y="528143"/>
-            <a:ext cx="4041775" cy="639762"/>
-          </a:xfrm>
-        </p:spPr>
-        <p:txBody>
-          <a:bodyPr/>
-          <a:lstStyle/>
-          <a:p>
-            <a:r>
-              <a:rPr lang="en-US" sz="2400" dirty="0" smtClean="0"/>
-              <a:t>Conclusion</a:t>
-            </a:r>
-            <a:endParaRPr lang="en-US" sz="2400" dirty="0"/>
-          </a:p>
-        </p:txBody>
-      </p:sp>
-      <p:sp>
-        <p:nvSpPr>
-          <p:cNvPr id="8" name="Content Placeholder 7"/>
-          <p:cNvSpPr>
-            <a:spLocks noGrp="1"/>
-          </p:cNvSpPr>
-          <p:nvPr>
-            <p:ph sz="quarter" idx="4"/>
-          </p:nvPr>
-        </p:nvSpPr>
-        <p:spPr>
-          <a:xfrm>
-            <a:off x="4645027" y="1167907"/>
-            <a:ext cx="3555079" cy="3227114"/>
-          </a:xfrm>
-        </p:spPr>
-        <p:txBody>
-          <a:bodyPr>
-            <a:normAutofit/>
-          </a:bodyPr>
-          <a:lstStyle/>
-          <a:p>
-            <a:r>
-              <a:rPr lang="en-US" dirty="0" smtClean="0"/>
-              <a:t>New way to rank players based on individual contributions</a:t>
-            </a:r>
-          </a:p>
-          <a:p>
-            <a:endParaRPr lang="en-US" dirty="0" smtClean="0"/>
-          </a:p>
-        </p:txBody>
-      </p:sp>
-      <p:sp>
-        <p:nvSpPr>
-          <p:cNvPr id="9" name="Text Placeholder 6"/>
-          <p:cNvSpPr txBox="1">
-            <a:spLocks/>
-          </p:cNvSpPr>
-          <p:nvPr/>
-        </p:nvSpPr>
-        <p:spPr>
-          <a:xfrm>
-            <a:off x="4659125" y="4151243"/>
-            <a:ext cx="4041775" cy="639762"/>
-          </a:xfrm>
-          <a:prstGeom prst="rect">
-            <a:avLst/>
-          </a:prstGeom>
-        </p:spPr>
-        <p:txBody>
-          <a:bodyPr vert="horz" lIns="91440" tIns="45720" rIns="91440" bIns="45720" rtlCol="0" anchor="b">
-            <a:noAutofit/>
-          </a:bodyPr>
-          <a:lstStyle/>
-          <a:p>
-            <a:pPr marL="0" marR="0" lvl="0" indent="0" algn="ctr" defTabSz="914400" rtl="0" eaLnBrk="1" fontAlgn="auto" latinLnBrk="0" hangingPunct="1">
-              <a:lnSpc>
-                <a:spcPct val="100000"/>
-              </a:lnSpc>
-              <a:spcBef>
-                <a:spcPct val="0"/>
-              </a:spcBef>
-              <a:spcAft>
-                <a:spcPts val="0"/>
-              </a:spcAft>
-              <a:buClr>
-                <a:schemeClr val="accent1"/>
-              </a:buClr>
-              <a:buSzPct val="100000"/>
-              <a:buFont typeface="Wingdings 2" pitchFamily="18" charset="2"/>
-              <a:buNone/>
-              <a:tabLst/>
-              <a:defRPr/>
-            </a:pPr>
-            <a:endParaRPr kumimoji="0" lang="en-US" sz="2000" b="1" i="0" u="none" strike="noStrike" kern="1200" cap="none" spc="0" normalizeH="0" baseline="0" noProof="0" dirty="0">
-              <a:ln>
-                <a:noFill/>
-              </a:ln>
-              <a:solidFill>
-                <a:schemeClr val="accent1"/>
-              </a:solidFill>
-              <a:effectLst/>
-              <a:uLnTx/>
-              <a:uFillTx/>
-              <a:latin typeface="+mn-lt"/>
-              <a:ea typeface="+mn-ea"/>
-              <a:cs typeface="+mn-cs"/>
-            </a:endParaRPr>
-          </a:p>
-        </p:txBody>
-      </p:sp>
-      <p:sp>
-        <p:nvSpPr>
-          <p:cNvPr id="10" name="Content Placeholder 7"/>
-          <p:cNvSpPr txBox="1">
-            <a:spLocks/>
-          </p:cNvSpPr>
-          <p:nvPr/>
-        </p:nvSpPr>
-        <p:spPr>
-          <a:xfrm>
-            <a:off x="4659125" y="4791006"/>
-            <a:ext cx="4041775" cy="1384786"/>
-          </a:xfrm>
-          <a:prstGeom prst="rect">
-            <a:avLst/>
-          </a:prstGeom>
-        </p:spPr>
-        <p:txBody>
-          <a:bodyPr vert="horz" lIns="91440" tIns="45720" rIns="91440" bIns="45720" rtlCol="0">
-            <a:normAutofit/>
-          </a:bodyPr>
-          <a:lstStyle/>
-          <a:p>
-            <a:pPr marL="228600" marR="0" lvl="0" indent="-228600" algn="l" defTabSz="914400" rtl="0" eaLnBrk="1" fontAlgn="auto" latinLnBrk="0" hangingPunct="1">
-              <a:lnSpc>
-                <a:spcPct val="100000"/>
-              </a:lnSpc>
-              <a:spcBef>
-                <a:spcPts val="1800"/>
-              </a:spcBef>
-              <a:spcAft>
-                <a:spcPts val="0"/>
-              </a:spcAft>
-              <a:buClr>
-                <a:schemeClr val="accent1"/>
-              </a:buClr>
-              <a:buSzPct val="100000"/>
-              <a:buFont typeface="Wingdings 2" pitchFamily="18" charset="2"/>
-              <a:buChar char="¡"/>
-              <a:tabLst/>
-              <a:defRPr/>
-            </a:pPr>
-            <a:endParaRPr kumimoji="0" lang="en-US" sz="1800" b="0" i="0" u="none" strike="noStrike" kern="1200" cap="none" spc="0" normalizeH="0" baseline="0" noProof="0" dirty="0" smtClean="0">
-              <a:ln>
-                <a:noFill/>
-              </a:ln>
-              <a:solidFill>
-                <a:schemeClr val="tx2"/>
-              </a:solidFill>
-              <a:effectLst/>
-              <a:uLnTx/>
-              <a:uFillTx/>
-              <a:latin typeface="+mn-lt"/>
-              <a:ea typeface="+mn-ea"/>
-              <a:cs typeface="+mn-cs"/>
-            </a:endParaRPr>
-          </a:p>
-        </p:txBody>
-      </p:sp>
-    </p:spTree>
-  </p:cSld>
-  <p:clrMapOvr>
-    <a:masterClrMapping/>
-  </p:clrMapOvr>
-</p:sld>
-</file>
-
-<file path=ppt/slides/slide7.xml><?xml version="1.0" encoding="utf-8"?>
-<p:sld xmlns:a="http://schemas.openxmlformats.org/drawingml/2006/main" xmlns:r="http://schemas.openxmlformats.org/officeDocument/2006/relationships" xmlns:mc="http://schemas.openxmlformats.org/markup-compatibility/2006" xmlns:mv="urn:schemas-microsoft-com:mac:vml" xmlns:p="http://schemas.openxmlformats.org/presentationml/2006/main" mc:Ignorable="mv" mc:PreserveAttributes="mv:*">
-  <p:cSld>
-    <p:spTree>
-      <p:nvGrpSpPr>
-        <p:cNvPr id="1" name=""/>
-        <p:cNvGrpSpPr/>
-        <p:nvPr/>
-      </p:nvGrpSpPr>
-      <p:grpSpPr>
-        <a:xfrm>
-          <a:off x="0" y="0"/>
-          <a:ext cx="0" cy="0"/>
-          <a:chOff x="0" y="0"/>
-          <a:chExt cx="0" cy="0"/>
-        </a:xfrm>
-      </p:grpSpPr>
-      <p:sp>
-        <p:nvSpPr>
           <p:cNvPr id="4" name="Title 3"/>
           <p:cNvSpPr>
             <a:spLocks noGrp="1"/>
@@ -14855,7 +14583,7 @@
         </p:nvGraphicFramePr>
         <p:xfrm>
           <a:off x="362575" y="2278364"/>
-          <a:ext cx="3630868" cy="2950759"/>
+          <a:ext cx="3630868" cy="3380151"/>
         </p:xfrm>
         <a:graphic>
           <a:graphicData uri="http://schemas.openxmlformats.org/drawingml/2006/table">
@@ -15104,116 +14832,6 @@
                       <a:pPr algn="ctr"/>
                       <a:r>
                         <a:rPr lang="en-US" sz="1500" dirty="0" smtClean="0"/>
-                        <a:t>0.212</a:t>
-                      </a:r>
-                      <a:endParaRPr lang="en-US" sz="1500" dirty="0"/>
-                    </a:p>
-                  </a:txBody>
-                  <a:tcPr marL="111635" marR="111635" marT="55818" marB="55818"/>
-                </a:tc>
-                <a:tc>
-                  <a:txBody>
-                    <a:bodyPr/>
-                    <a:lstStyle/>
-                    <a:p>
-                      <a:pPr algn="ctr"/>
-                      <a:r>
-                        <a:rPr lang="en-US" sz="1500" b="0" dirty="0" smtClean="0">
-                          <a:solidFill>
-                            <a:schemeClr val="tx1"/>
-                          </a:solidFill>
-                        </a:rPr>
-                        <a:t>-0.214</a:t>
-                      </a:r>
-                      <a:endParaRPr lang="en-US" sz="1500" b="0" dirty="0">
-                        <a:solidFill>
-                          <a:schemeClr val="tx1"/>
-                        </a:solidFill>
-                      </a:endParaRPr>
-                    </a:p>
-                  </a:txBody>
-                  <a:tcPr marL="111635" marR="111635" marT="55818" marB="55818"/>
-                </a:tc>
-                <a:tc>
-                  <a:txBody>
-                    <a:bodyPr/>
-                    <a:lstStyle/>
-                    <a:p>
-                      <a:pPr algn="ctr"/>
-                      <a:r>
-                        <a:rPr lang="en-US" sz="1500" b="1" dirty="0" smtClean="0"/>
-                        <a:t>Kyle Lowry</a:t>
-                      </a:r>
-                      <a:endParaRPr lang="en-US" sz="1500" b="1" dirty="0"/>
-                    </a:p>
-                  </a:txBody>
-                  <a:tcPr marL="111635" marR="111635" marT="55818" marB="55818"/>
-                </a:tc>
-              </a:tr>
-              <a:tr h="429392">
-                <a:tc>
-                  <a:txBody>
-                    <a:bodyPr/>
-                    <a:lstStyle/>
-                    <a:p>
-                      <a:pPr algn="ctr"/>
-                      <a:r>
-                        <a:rPr lang="en-US" sz="1500" dirty="0" smtClean="0"/>
-                        <a:t>0.240</a:t>
-                      </a:r>
-                      <a:endParaRPr lang="en-US" sz="1500" dirty="0"/>
-                    </a:p>
-                  </a:txBody>
-                  <a:tcPr marL="111635" marR="111635" marT="55818" marB="55818"/>
-                </a:tc>
-                <a:tc>
-                  <a:txBody>
-                    <a:bodyPr/>
-                    <a:lstStyle/>
-                    <a:p>
-                      <a:pPr algn="ctr"/>
-                      <a:r>
-                        <a:rPr lang="en-US" sz="1500" b="0" dirty="0" smtClean="0">
-                          <a:solidFill>
-                            <a:schemeClr val="tx1"/>
-                          </a:solidFill>
-                        </a:rPr>
-                        <a:t>-0.185</a:t>
-                      </a:r>
-                      <a:endParaRPr lang="en-US" sz="1500" b="0" dirty="0">
-                        <a:solidFill>
-                          <a:schemeClr val="tx1"/>
-                        </a:solidFill>
-                      </a:endParaRPr>
-                    </a:p>
-                  </a:txBody>
-                  <a:tcPr marL="111635" marR="111635" marT="55818" marB="55818"/>
-                </a:tc>
-                <a:tc>
-                  <a:txBody>
-                    <a:bodyPr/>
-                    <a:lstStyle/>
-                    <a:p>
-                      <a:pPr algn="ctr"/>
-                      <a:r>
-                        <a:rPr lang="en-US" sz="1500" b="1" dirty="0" smtClean="0"/>
-                        <a:t>Tim Duncan</a:t>
-                      </a:r>
-                      <a:endParaRPr lang="en-US" sz="1500" b="1" dirty="0"/>
-                    </a:p>
-                  </a:txBody>
-                  <a:tcPr marL="111635" marR="111635" marT="55818" marB="55818"/>
-                </a:tc>
-              </a:tr>
-              <a:tr h="429392">
-                <a:tc>
-                  <a:txBody>
-                    <a:bodyPr/>
-                    <a:lstStyle/>
-                    <a:p>
-                      <a:pPr algn="ctr"/>
-                      <a:r>
-                        <a:rPr lang="en-US" sz="1500" dirty="0" smtClean="0"/>
                         <a:t>-0.029</a:t>
                       </a:r>
                       <a:endParaRPr lang="en-US" sz="1500" dirty="0"/>
@@ -15264,6 +14882,207 @@
                   <a:tcPr marL="111635" marR="111635" marT="55818" marB="55818"/>
                 </a:tc>
               </a:tr>
+              <a:tr h="429392">
+                <a:tc>
+                  <a:txBody>
+                    <a:bodyPr/>
+                    <a:lstStyle/>
+                    <a:p>
+                      <a:pPr algn="ctr"/>
+                      <a:r>
+                        <a:rPr lang="en-US" sz="1500" dirty="0" smtClean="0">
+                          <a:solidFill>
+                            <a:srgbClr val="FF0000"/>
+                          </a:solidFill>
+                        </a:rPr>
+                        <a:t>-0.480</a:t>
+                      </a:r>
+                      <a:endParaRPr lang="en-US" sz="1500" dirty="0">
+                        <a:solidFill>
+                          <a:srgbClr val="FF0000"/>
+                        </a:solidFill>
+                      </a:endParaRPr>
+                    </a:p>
+                  </a:txBody>
+                  <a:tcPr marL="111635" marR="111635" marT="55818" marB="55818"/>
+                </a:tc>
+                <a:tc>
+                  <a:txBody>
+                    <a:bodyPr/>
+                    <a:lstStyle/>
+                    <a:p>
+                      <a:pPr algn="ctr"/>
+                      <a:r>
+                        <a:rPr lang="en-US" sz="1500" b="0" dirty="0" smtClean="0">
+                          <a:solidFill>
+                            <a:srgbClr val="FF0000"/>
+                          </a:solidFill>
+                        </a:rPr>
+                        <a:t>0.033</a:t>
+                      </a:r>
+                      <a:endParaRPr lang="en-US" sz="1500" b="0" dirty="0">
+                        <a:solidFill>
+                          <a:srgbClr val="FF0000"/>
+                        </a:solidFill>
+                      </a:endParaRPr>
+                    </a:p>
+                  </a:txBody>
+                  <a:tcPr marL="111635" marR="111635" marT="55818" marB="55818"/>
+                </a:tc>
+                <a:tc>
+                  <a:txBody>
+                    <a:bodyPr/>
+                    <a:lstStyle/>
+                    <a:p>
+                      <a:pPr algn="ctr"/>
+                      <a:r>
+                        <a:rPr lang="en-US" sz="1500" b="1" dirty="0" smtClean="0"/>
+                        <a:t>Ron </a:t>
+                      </a:r>
+                      <a:r>
+                        <a:rPr lang="en-US" sz="1500" b="1" dirty="0" err="1" smtClean="0"/>
+                        <a:t>Artest</a:t>
+                      </a:r>
+                      <a:endParaRPr lang="en-US" sz="1500" b="1" dirty="0"/>
+                    </a:p>
+                  </a:txBody>
+                  <a:tcPr marL="111635" marR="111635" marT="55818" marB="55818"/>
+                </a:tc>
+              </a:tr>
+              <a:tr h="429392">
+                <a:tc>
+                  <a:txBody>
+                    <a:bodyPr/>
+                    <a:lstStyle/>
+                    <a:p>
+                      <a:pPr algn="ctr"/>
+                      <a:r>
+                        <a:rPr lang="en-US" sz="1500" dirty="0" smtClean="0">
+                          <a:solidFill>
+                            <a:srgbClr val="FF0000"/>
+                          </a:solidFill>
+                        </a:rPr>
+                        <a:t>-0.195</a:t>
+                      </a:r>
+                      <a:endParaRPr lang="en-US" sz="1500" dirty="0">
+                        <a:solidFill>
+                          <a:srgbClr val="FF0000"/>
+                        </a:solidFill>
+                      </a:endParaRPr>
+                    </a:p>
+                  </a:txBody>
+                  <a:tcPr marL="111635" marR="111635" marT="55818" marB="55818"/>
+                </a:tc>
+                <a:tc>
+                  <a:txBody>
+                    <a:bodyPr/>
+                    <a:lstStyle/>
+                    <a:p>
+                      <a:pPr algn="ctr"/>
+                      <a:r>
+                        <a:rPr lang="en-US" sz="1500" b="0" dirty="0" smtClean="0">
+                          <a:solidFill>
+                            <a:srgbClr val="FF0000"/>
+                          </a:solidFill>
+                        </a:rPr>
+                        <a:t>0.452</a:t>
+                      </a:r>
+                      <a:endParaRPr lang="en-US" sz="1500" b="0" dirty="0">
+                        <a:solidFill>
+                          <a:srgbClr val="FF0000"/>
+                        </a:solidFill>
+                      </a:endParaRPr>
+                    </a:p>
+                  </a:txBody>
+                  <a:tcPr marL="111635" marR="111635" marT="55818" marB="55818"/>
+                </a:tc>
+                <a:tc>
+                  <a:txBody>
+                    <a:bodyPr/>
+                    <a:lstStyle/>
+                    <a:p>
+                      <a:pPr algn="ctr"/>
+                      <a:r>
+                        <a:rPr lang="en-US" sz="1500" b="1" dirty="0" err="1" smtClean="0"/>
+                        <a:t>Rasual</a:t>
+                      </a:r>
+                      <a:r>
+                        <a:rPr lang="en-US" sz="1500" b="1" dirty="0" smtClean="0"/>
+                        <a:t> Butler</a:t>
+                      </a:r>
+                      <a:endParaRPr lang="en-US" sz="1500" b="1" dirty="0"/>
+                    </a:p>
+                  </a:txBody>
+                  <a:tcPr marL="111635" marR="111635" marT="55818" marB="55818"/>
+                </a:tc>
+              </a:tr>
+              <a:tr h="429392">
+                <a:tc>
+                  <a:txBody>
+                    <a:bodyPr/>
+                    <a:lstStyle/>
+                    <a:p>
+                      <a:pPr algn="ctr"/>
+                      <a:r>
+                        <a:rPr lang="en-US" sz="1500" dirty="0" smtClean="0">
+                          <a:solidFill>
+                            <a:srgbClr val="FF0000"/>
+                          </a:solidFill>
+                        </a:rPr>
+                        <a:t>-0.482</a:t>
+                      </a:r>
+                      <a:endParaRPr lang="en-US" sz="1500" dirty="0">
+                        <a:solidFill>
+                          <a:srgbClr val="FF0000"/>
+                        </a:solidFill>
+                      </a:endParaRPr>
+                    </a:p>
+                  </a:txBody>
+                  <a:tcPr marL="111635" marR="111635" marT="55818" marB="55818"/>
+                </a:tc>
+                <a:tc>
+                  <a:txBody>
+                    <a:bodyPr/>
+                    <a:lstStyle/>
+                    <a:p>
+                      <a:pPr algn="ctr"/>
+                      <a:r>
+                        <a:rPr lang="en-US" sz="1500" b="0" dirty="0" smtClean="0">
+                          <a:solidFill>
+                            <a:srgbClr val="FF0000"/>
+                          </a:solidFill>
+                        </a:rPr>
+                        <a:t>0.398</a:t>
+                      </a:r>
+                      <a:endParaRPr lang="en-US" sz="1500" b="0" dirty="0">
+                        <a:solidFill>
+                          <a:srgbClr val="FF0000"/>
+                        </a:solidFill>
+                      </a:endParaRPr>
+                    </a:p>
+                  </a:txBody>
+                  <a:tcPr marL="111635" marR="111635" marT="55818" marB="55818"/>
+                </a:tc>
+                <a:tc>
+                  <a:txBody>
+                    <a:bodyPr/>
+                    <a:lstStyle/>
+                    <a:p>
+                      <a:pPr algn="ctr"/>
+                      <a:r>
+                        <a:rPr lang="en-US" sz="1500" b="1" dirty="0" smtClean="0"/>
+                        <a:t>Dirk </a:t>
+                      </a:r>
+                      <a:r>
+                        <a:rPr lang="en-US" sz="1500" b="1" dirty="0" err="1" smtClean="0"/>
+                        <a:t>Nowitzki</a:t>
+                      </a:r>
+                      <a:endParaRPr lang="en-US" sz="1500" b="1" dirty="0"/>
+                    </a:p>
+                  </a:txBody>
+                  <a:tcPr marL="111635" marR="111635" marT="55818" marB="55818"/>
+                </a:tc>
+              </a:tr>
             </a:tbl>
           </a:graphicData>
         </a:graphic>
@@ -15325,7 +15144,7 @@
                 <a:ea typeface="+mn-ea"/>
                 <a:cs typeface="+mn-cs"/>
               </a:rPr>
-              <a:t>Top 2</a:t>
+              <a:t>2</a:t>
             </a:r>
             <a:r>
               <a:rPr kumimoji="0" lang="en-US" sz="2000" b="1" i="0" u="none" strike="noStrike" kern="1200" cap="none" spc="0" normalizeH="0" noProof="0" dirty="0" smtClean="0">
@@ -15342,7 +15161,24 @@
                 <a:ea typeface="+mn-ea"/>
                 <a:cs typeface="+mn-cs"/>
               </a:rPr>
-              <a:t> pt </a:t>
+              <a:t> </a:t>
+            </a:r>
+            <a:r>
+              <a:rPr kumimoji="0" lang="en-US" sz="2000" b="1" i="0" u="none" strike="noStrike" kern="1200" cap="none" spc="0" normalizeH="0" noProof="0" dirty="0" smtClean="0">
+                <a:ln>
+                  <a:noFill/>
+                </a:ln>
+                <a:solidFill>
+                  <a:schemeClr val="accent1"/>
+                </a:solidFill>
+                <a:effectLst/>
+                <a:uLnTx/>
+                <a:uFillTx/>
+                <a:latin typeface="+mn-lt"/>
+                <a:ea typeface="+mn-ea"/>
+                <a:cs typeface="+mn-cs"/>
+              </a:rPr>
+              <a:t>pt </a:t>
             </a:r>
             <a:r>
               <a:rPr lang="en-US" sz="2000" b="1" dirty="0" smtClean="0">
@@ -15449,8 +15285,8 @@
         </p:nvSpPr>
         <p:spPr>
           <a:xfrm>
-            <a:off x="362575" y="5752343"/>
-            <a:ext cx="3157243" cy="307777"/>
+            <a:off x="4614928" y="1682519"/>
+            <a:ext cx="3233510" cy="307777"/>
           </a:xfrm>
           <a:prstGeom prst="rect">
             <a:avLst/>
@@ -15465,11 +15301,7 @@
           <a:p>
             <a:r>
               <a:rPr lang="en-US" sz="1400" dirty="0" smtClean="0"/>
-              <a:t>35 games; 3152 </a:t>
-            </a:r>
-            <a:r>
-              <a:rPr lang="en-US" sz="1400" dirty="0" smtClean="0"/>
-              <a:t>1</a:t>
+              <a:t>35 games; 3152 1</a:t>
             </a:r>
             <a:r>
               <a:rPr lang="en-US" sz="1400" baseline="30000" dirty="0" smtClean="0"/>
@@ -15481,7 +15313,11 @@
             </a:r>
             <a:r>
               <a:rPr lang="en-US" sz="1400" dirty="0" smtClean="0"/>
-              <a:t>possessions </a:t>
+              <a:t>possessions</a:t>
+            </a:r>
+            <a:r>
+              <a:rPr lang="en-US" sz="1400" dirty="0" smtClean="0"/>
+              <a:t>*</a:t>
             </a:r>
             <a:endParaRPr lang="en-US" sz="1400" dirty="0"/>
           </a:p>
@@ -15495,7 +15331,7 @@
         </p:nvSpPr>
         <p:spPr>
           <a:xfrm>
-            <a:off x="362575" y="5229123"/>
+            <a:off x="4614928" y="1159299"/>
             <a:ext cx="4572000" cy="523220"/>
           </a:xfrm>
           <a:prstGeom prst="rect">
@@ -15519,6 +15355,1425 @@
               <a:t>Defensive Skills: Lower the better</a:t>
             </a:r>
             <a:endParaRPr lang="en-US" sz="1400" dirty="0"/>
+          </a:p>
+        </p:txBody>
+      </p:sp>
+    </p:spTree>
+  </p:cSld>
+  <p:clrMapOvr>
+    <a:masterClrMapping/>
+  </p:clrMapOvr>
+</p:sld>
+</file>
+
+<file path=ppt/slides/slide7.xml><?xml version="1.0" encoding="utf-8"?>
+<p:sld xmlns:a="http://schemas.openxmlformats.org/drawingml/2006/main" xmlns:r="http://schemas.openxmlformats.org/officeDocument/2006/relationships" xmlns:mc="http://schemas.openxmlformats.org/markup-compatibility/2006" xmlns:mv="urn:schemas-microsoft-com:mac:vml" xmlns:p="http://schemas.openxmlformats.org/presentationml/2006/main" mc:Ignorable="mv" mc:PreserveAttributes="mv:*">
+  <p:cSld>
+    <p:spTree>
+      <p:nvGrpSpPr>
+        <p:cNvPr id="1" name=""/>
+        <p:cNvGrpSpPr/>
+        <p:nvPr/>
+      </p:nvGrpSpPr>
+      <p:grpSpPr>
+        <a:xfrm>
+          <a:off x="0" y="0"/>
+          <a:ext cx="0" cy="0"/>
+          <a:chOff x="0" y="0"/>
+          <a:chExt cx="0" cy="0"/>
+        </a:xfrm>
+      </p:grpSpPr>
+      <p:sp>
+        <p:nvSpPr>
+          <p:cNvPr id="15" name="Text Placeholder 4"/>
+          <p:cNvSpPr txBox="1">
+            <a:spLocks/>
+          </p:cNvSpPr>
+          <p:nvPr/>
+        </p:nvSpPr>
+        <p:spPr>
+          <a:xfrm>
+            <a:off x="-44907" y="1521904"/>
+            <a:ext cx="4040188" cy="639762"/>
+          </a:xfrm>
+          <a:prstGeom prst="rect">
+            <a:avLst/>
+          </a:prstGeom>
+        </p:spPr>
+        <p:txBody>
+          <a:bodyPr vert="horz" lIns="91440" tIns="45720" rIns="91440" bIns="45720" rtlCol="0" anchor="b">
+            <a:noAutofit/>
+          </a:bodyPr>
+          <a:lstStyle/>
+          <a:p>
+            <a:pPr marL="0" marR="0" lvl="0" indent="0" algn="ctr" defTabSz="914400" rtl="0" eaLnBrk="1" fontAlgn="auto" latinLnBrk="0" hangingPunct="1">
+              <a:lnSpc>
+                <a:spcPct val="100000"/>
+              </a:lnSpc>
+              <a:spcBef>
+                <a:spcPct val="0"/>
+              </a:spcBef>
+              <a:spcAft>
+                <a:spcPts val="0"/>
+              </a:spcAft>
+              <a:buClr>
+                <a:schemeClr val="accent1"/>
+              </a:buClr>
+              <a:buSzPct val="100000"/>
+              <a:buFont typeface="Wingdings 2" pitchFamily="18" charset="2"/>
+              <a:buNone/>
+              <a:tabLst/>
+              <a:defRPr/>
+            </a:pPr>
+            <a:r>
+              <a:rPr kumimoji="0" lang="en-US" sz="2000" b="1" i="0" u="none" strike="noStrike" kern="1200" cap="none" spc="0" normalizeH="0" baseline="0" noProof="0" dirty="0" smtClean="0">
+                <a:ln>
+                  <a:noFill/>
+                </a:ln>
+                <a:solidFill>
+                  <a:schemeClr val="accent1"/>
+                </a:solidFill>
+                <a:effectLst/>
+                <a:uLnTx/>
+                <a:uFillTx/>
+                <a:latin typeface="+mn-lt"/>
+                <a:ea typeface="+mn-ea"/>
+                <a:cs typeface="+mn-cs"/>
+              </a:rPr>
+              <a:t>Offensive/Defensive Skills</a:t>
+            </a:r>
+            <a:endParaRPr kumimoji="0" lang="en-US" sz="2000" b="1" i="0" u="none" strike="noStrike" kern="1200" cap="none" spc="0" normalizeH="0" baseline="0" noProof="0" dirty="0">
+              <a:ln>
+                <a:noFill/>
+              </a:ln>
+              <a:solidFill>
+                <a:schemeClr val="accent1"/>
+              </a:solidFill>
+              <a:effectLst/>
+              <a:uLnTx/>
+              <a:uFillTx/>
+              <a:latin typeface="+mn-lt"/>
+              <a:ea typeface="+mn-ea"/>
+              <a:cs typeface="+mn-cs"/>
+            </a:endParaRPr>
+          </a:p>
+        </p:txBody>
+      </p:sp>
+      <p:sp>
+        <p:nvSpPr>
+          <p:cNvPr id="16" name="Content Placeholder 5"/>
+          <p:cNvSpPr txBox="1">
+            <a:spLocks/>
+          </p:cNvSpPr>
+          <p:nvPr/>
+        </p:nvSpPr>
+        <p:spPr>
+          <a:xfrm>
+            <a:off x="522667" y="1521904"/>
+            <a:ext cx="4040188" cy="2364723"/>
+          </a:xfrm>
+          <a:prstGeom prst="rect">
+            <a:avLst/>
+          </a:prstGeom>
+        </p:spPr>
+        <p:txBody>
+          <a:bodyPr vert="horz" lIns="91440" tIns="45720" rIns="91440" bIns="45720" rtlCol="0">
+            <a:normAutofit/>
+          </a:bodyPr>
+          <a:lstStyle/>
+          <a:p>
+            <a:pPr marL="228600" marR="0" lvl="0" indent="-228600" algn="l" defTabSz="914400" rtl="0" eaLnBrk="1" fontAlgn="auto" latinLnBrk="0" hangingPunct="1">
+              <a:lnSpc>
+                <a:spcPct val="100000"/>
+              </a:lnSpc>
+              <a:spcBef>
+                <a:spcPts val="1800"/>
+              </a:spcBef>
+              <a:spcAft>
+                <a:spcPts val="0"/>
+              </a:spcAft>
+              <a:buClr>
+                <a:schemeClr val="accent1"/>
+              </a:buClr>
+              <a:buSzPct val="100000"/>
+              <a:buFont typeface="Wingdings 2" pitchFamily="18" charset="2"/>
+              <a:buChar char="¡"/>
+              <a:tabLst/>
+              <a:defRPr/>
+            </a:pPr>
+            <a:endParaRPr kumimoji="0" lang="en-US" sz="1800" b="0" i="0" u="none" strike="noStrike" kern="1200" cap="none" spc="0" normalizeH="0" baseline="0" noProof="0" dirty="0" smtClean="0">
+              <a:ln>
+                <a:noFill/>
+              </a:ln>
+              <a:solidFill>
+                <a:schemeClr val="tx2"/>
+              </a:solidFill>
+              <a:effectLst/>
+              <a:uLnTx/>
+              <a:uFillTx/>
+              <a:latin typeface="+mn-lt"/>
+              <a:ea typeface="+mn-ea"/>
+              <a:cs typeface="+mn-cs"/>
+            </a:endParaRPr>
+          </a:p>
+        </p:txBody>
+      </p:sp>
+      <p:sp>
+        <p:nvSpPr>
+          <p:cNvPr id="18" name="Text Placeholder 4"/>
+          <p:cNvSpPr txBox="1">
+            <a:spLocks/>
+          </p:cNvSpPr>
+          <p:nvPr/>
+        </p:nvSpPr>
+        <p:spPr>
+          <a:xfrm>
+            <a:off x="139994" y="3325524"/>
+            <a:ext cx="4040188" cy="639762"/>
+          </a:xfrm>
+          <a:prstGeom prst="rect">
+            <a:avLst/>
+          </a:prstGeom>
+        </p:spPr>
+        <p:txBody>
+          <a:bodyPr vert="horz" lIns="91440" tIns="45720" rIns="91440" bIns="45720" rtlCol="0" anchor="b">
+            <a:noAutofit/>
+          </a:bodyPr>
+          <a:lstStyle/>
+          <a:p>
+            <a:pPr marL="0" marR="0" lvl="0" indent="0" algn="ctr" defTabSz="914400" rtl="0" eaLnBrk="1" fontAlgn="auto" latinLnBrk="0" hangingPunct="1">
+              <a:lnSpc>
+                <a:spcPct val="100000"/>
+              </a:lnSpc>
+              <a:spcBef>
+                <a:spcPct val="0"/>
+              </a:spcBef>
+              <a:spcAft>
+                <a:spcPts val="0"/>
+              </a:spcAft>
+              <a:buClr>
+                <a:schemeClr val="accent1"/>
+              </a:buClr>
+              <a:buSzPct val="100000"/>
+              <a:buFont typeface="Wingdings 2" pitchFamily="18" charset="2"/>
+              <a:buNone/>
+              <a:tabLst/>
+              <a:defRPr/>
+            </a:pPr>
+            <a:endParaRPr kumimoji="0" lang="en-US" sz="2000" b="1" i="0" u="none" strike="noStrike" kern="1200" cap="none" spc="0" normalizeH="0" baseline="0" noProof="0" dirty="0">
+              <a:ln>
+                <a:noFill/>
+              </a:ln>
+              <a:solidFill>
+                <a:schemeClr val="accent1"/>
+              </a:solidFill>
+              <a:effectLst/>
+              <a:uLnTx/>
+              <a:uFillTx/>
+              <a:latin typeface="+mn-lt"/>
+              <a:ea typeface="+mn-ea"/>
+              <a:cs typeface="+mn-cs"/>
+            </a:endParaRPr>
+          </a:p>
+        </p:txBody>
+      </p:sp>
+      <p:graphicFrame>
+        <p:nvGraphicFramePr>
+          <p:cNvPr id="9" name="Table 8"/>
+          <p:cNvGraphicFramePr>
+            <a:graphicFrameLocks noGrp="1"/>
+          </p:cNvGraphicFramePr>
+          <p:nvPr/>
+        </p:nvGraphicFramePr>
+        <p:xfrm>
+          <a:off x="362575" y="2304910"/>
+          <a:ext cx="8467916" cy="2293796"/>
+        </p:xfrm>
+        <a:graphic>
+          <a:graphicData uri="http://schemas.openxmlformats.org/drawingml/2006/table">
+            <a:tbl>
+              <a:tblPr firstRow="1" bandRow="1">
+                <a:tableStyleId>{5C22544A-7EE6-4342-B048-85BDC9FD1C3A}</a:tableStyleId>
+              </a:tblPr>
+              <a:tblGrid>
+                <a:gridCol w="1535947"/>
+                <a:gridCol w="1086739"/>
+                <a:gridCol w="1044910"/>
+                <a:gridCol w="1200080"/>
+                <a:gridCol w="1200080"/>
+                <a:gridCol w="1200080"/>
+                <a:gridCol w="1200080"/>
+              </a:tblGrid>
+              <a:tr h="410528">
+                <a:tc>
+                  <a:txBody>
+                    <a:bodyPr/>
+                    <a:lstStyle/>
+                    <a:p>
+                      <a:endParaRPr lang="en-US" sz="1600" b="0" dirty="0"/>
+                    </a:p>
+                  </a:txBody>
+                  <a:tcPr marL="122405" marR="122405" marT="61203" marB="61203"/>
+                </a:tc>
+                <a:tc>
+                  <a:txBody>
+                    <a:bodyPr/>
+                    <a:lstStyle/>
+                    <a:p>
+                      <a:pPr algn="ctr"/>
+                      <a:r>
+                        <a:rPr lang="en-US" sz="1600" b="0" dirty="0" smtClean="0"/>
+                        <a:t>Off.</a:t>
+                      </a:r>
+                      <a:r>
+                        <a:rPr lang="en-US" sz="1600" b="0" baseline="0" dirty="0" smtClean="0"/>
+                        <a:t> 1 pt</a:t>
+                      </a:r>
+                      <a:endParaRPr lang="en-US" sz="1600" b="0" dirty="0"/>
+                    </a:p>
+                  </a:txBody>
+                  <a:tcPr marL="122405" marR="122405" marT="61203" marB="61203"/>
+                </a:tc>
+                <a:tc>
+                  <a:txBody>
+                    <a:bodyPr/>
+                    <a:lstStyle/>
+                    <a:p>
+                      <a:pPr algn="ctr"/>
+                      <a:r>
+                        <a:rPr lang="en-US" sz="1600" b="0" dirty="0" smtClean="0"/>
+                        <a:t>Off. 2 pt</a:t>
+                      </a:r>
+                      <a:endParaRPr lang="en-US" sz="1600" b="0" dirty="0"/>
+                    </a:p>
+                  </a:txBody>
+                  <a:tcPr marL="122405" marR="122405" marT="61203" marB="61203"/>
+                </a:tc>
+                <a:tc>
+                  <a:txBody>
+                    <a:bodyPr/>
+                    <a:lstStyle/>
+                    <a:p>
+                      <a:pPr algn="ctr"/>
+                      <a:r>
+                        <a:rPr lang="en-US" sz="1600" b="0" dirty="0" smtClean="0"/>
+                        <a:t>Off. 3 pt</a:t>
+                      </a:r>
+                      <a:endParaRPr lang="en-US" sz="1600" b="0" dirty="0"/>
+                    </a:p>
+                  </a:txBody>
+                  <a:tcPr marL="122405" marR="122405" marT="61203" marB="61203"/>
+                </a:tc>
+                <a:tc>
+                  <a:txBody>
+                    <a:bodyPr/>
+                    <a:lstStyle/>
+                    <a:p>
+                      <a:pPr algn="ctr"/>
+                      <a:r>
+                        <a:rPr lang="en-US" sz="1600" b="0" dirty="0" smtClean="0"/>
+                        <a:t>Def. 1 pt</a:t>
+                      </a:r>
+                      <a:endParaRPr lang="en-US" sz="1600" b="0" dirty="0"/>
+                    </a:p>
+                  </a:txBody>
+                  <a:tcPr marL="122405" marR="122405" marT="61203" marB="61203"/>
+                </a:tc>
+                <a:tc>
+                  <a:txBody>
+                    <a:bodyPr/>
+                    <a:lstStyle/>
+                    <a:p>
+                      <a:pPr algn="ctr"/>
+                      <a:r>
+                        <a:rPr lang="en-US" sz="1600" b="0" dirty="0" smtClean="0"/>
+                        <a:t>Def.</a:t>
+                      </a:r>
+                      <a:r>
+                        <a:rPr lang="en-US" sz="1600" b="0" baseline="0" dirty="0" smtClean="0"/>
+                        <a:t> 2 pt</a:t>
+                      </a:r>
+                      <a:endParaRPr lang="en-US" sz="1600" b="0" dirty="0"/>
+                    </a:p>
+                  </a:txBody>
+                  <a:tcPr marL="122405" marR="122405" marT="61203" marB="61203"/>
+                </a:tc>
+                <a:tc>
+                  <a:txBody>
+                    <a:bodyPr/>
+                    <a:lstStyle/>
+                    <a:p>
+                      <a:pPr algn="ctr"/>
+                      <a:r>
+                        <a:rPr lang="en-US" sz="1600" b="0" dirty="0" smtClean="0"/>
+                        <a:t>Def. 3 pt</a:t>
+                      </a:r>
+                      <a:endParaRPr lang="en-US" sz="1600" b="0" dirty="0"/>
+                    </a:p>
+                  </a:txBody>
+                  <a:tcPr marL="122405" marR="122405" marT="61203" marB="61203"/>
+                </a:tc>
+              </a:tr>
+              <a:tr h="470817">
+                <a:tc>
+                  <a:txBody>
+                    <a:bodyPr/>
+                    <a:lstStyle/>
+                    <a:p>
+                      <a:r>
+                        <a:rPr lang="en-US" sz="1600" b="0" dirty="0" smtClean="0">
+                          <a:solidFill>
+                            <a:schemeClr val="tx1"/>
+                          </a:solidFill>
+                        </a:rPr>
+                        <a:t>Jason Terry</a:t>
+                      </a:r>
+                      <a:endParaRPr lang="en-US" sz="1600" b="0" dirty="0">
+                        <a:solidFill>
+                          <a:schemeClr val="tx1"/>
+                        </a:solidFill>
+                      </a:endParaRPr>
+                    </a:p>
+                  </a:txBody>
+                  <a:tcPr marL="122405" marR="122405" marT="61203" marB="61203"/>
+                </a:tc>
+                <a:tc>
+                  <a:txBody>
+                    <a:bodyPr/>
+                    <a:lstStyle/>
+                    <a:p>
+                      <a:pPr algn="ctr"/>
+                      <a:r>
+                        <a:rPr lang="en-US" sz="1600" b="0" dirty="0" smtClean="0">
+                          <a:solidFill>
+                            <a:schemeClr val="tx1"/>
+                          </a:solidFill>
+                        </a:rPr>
+                        <a:t>-527.858</a:t>
+                      </a:r>
+                      <a:endParaRPr lang="en-US" sz="1600" b="0" dirty="0">
+                        <a:solidFill>
+                          <a:schemeClr val="tx1"/>
+                        </a:solidFill>
+                      </a:endParaRPr>
+                    </a:p>
+                  </a:txBody>
+                  <a:tcPr marL="122405" marR="122405" marT="61203" marB="61203"/>
+                </a:tc>
+                <a:tc>
+                  <a:txBody>
+                    <a:bodyPr/>
+                    <a:lstStyle/>
+                    <a:p>
+                      <a:pPr algn="ctr"/>
+                      <a:r>
+                        <a:rPr lang="en-US" sz="1600" b="1" dirty="0" smtClean="0">
+                          <a:solidFill>
+                            <a:schemeClr val="tx1"/>
+                          </a:solidFill>
+                        </a:rPr>
+                        <a:t>0.478</a:t>
+                      </a:r>
+                      <a:endParaRPr lang="en-US" sz="1600" b="1" dirty="0">
+                        <a:solidFill>
+                          <a:schemeClr val="tx1"/>
+                        </a:solidFill>
+                      </a:endParaRPr>
+                    </a:p>
+                  </a:txBody>
+                  <a:tcPr marL="122405" marR="122405" marT="61203" marB="61203"/>
+                </a:tc>
+                <a:tc>
+                  <a:txBody>
+                    <a:bodyPr/>
+                    <a:lstStyle/>
+                    <a:p>
+                      <a:pPr algn="ctr"/>
+                      <a:r>
+                        <a:rPr lang="en-US" sz="1600" b="1" dirty="0" smtClean="0">
+                          <a:solidFill>
+                            <a:srgbClr val="FF0000"/>
+                          </a:solidFill>
+                        </a:rPr>
+                        <a:t>-1.836</a:t>
+                      </a:r>
+                      <a:endParaRPr lang="en-US" sz="1600" b="1" dirty="0">
+                        <a:solidFill>
+                          <a:srgbClr val="FF0000"/>
+                        </a:solidFill>
+                      </a:endParaRPr>
+                    </a:p>
+                  </a:txBody>
+                  <a:tcPr marL="122405" marR="122405" marT="61203" marB="61203"/>
+                </a:tc>
+                <a:tc>
+                  <a:txBody>
+                    <a:bodyPr/>
+                    <a:lstStyle/>
+                    <a:p>
+                      <a:pPr algn="ctr"/>
+                      <a:r>
+                        <a:rPr lang="en-US" sz="1600" b="0" dirty="0" smtClean="0">
+                          <a:solidFill>
+                            <a:schemeClr val="tx1"/>
+                          </a:solidFill>
+                        </a:rPr>
+                        <a:t>180.376</a:t>
+                      </a:r>
+                      <a:endParaRPr lang="en-US" sz="1600" b="0" dirty="0">
+                        <a:solidFill>
+                          <a:schemeClr val="tx1"/>
+                        </a:solidFill>
+                      </a:endParaRPr>
+                    </a:p>
+                  </a:txBody>
+                  <a:tcPr marL="122405" marR="122405" marT="61203" marB="61203"/>
+                </a:tc>
+                <a:tc>
+                  <a:txBody>
+                    <a:bodyPr/>
+                    <a:lstStyle/>
+                    <a:p>
+                      <a:pPr algn="ctr"/>
+                      <a:r>
+                        <a:rPr lang="en-US" sz="1600" b="1" dirty="0" smtClean="0">
+                          <a:solidFill>
+                            <a:schemeClr val="tx1"/>
+                          </a:solidFill>
+                        </a:rPr>
+                        <a:t>-0.528</a:t>
+                      </a:r>
+                      <a:endParaRPr lang="en-US" sz="1600" b="1" dirty="0">
+                        <a:solidFill>
+                          <a:schemeClr val="tx1"/>
+                        </a:solidFill>
+                      </a:endParaRPr>
+                    </a:p>
+                  </a:txBody>
+                  <a:tcPr marL="122405" marR="122405" marT="61203" marB="61203"/>
+                </a:tc>
+                <a:tc>
+                  <a:txBody>
+                    <a:bodyPr/>
+                    <a:lstStyle/>
+                    <a:p>
+                      <a:pPr algn="ctr"/>
+                      <a:r>
+                        <a:rPr lang="en-US" sz="1600" b="1" dirty="0" smtClean="0">
+                          <a:solidFill>
+                            <a:srgbClr val="FF0000"/>
+                          </a:solidFill>
+                        </a:rPr>
+                        <a:t>12.050</a:t>
+                      </a:r>
+                      <a:endParaRPr lang="en-US" sz="1600" b="1" dirty="0">
+                        <a:solidFill>
+                          <a:srgbClr val="FF0000"/>
+                        </a:solidFill>
+                      </a:endParaRPr>
+                    </a:p>
+                  </a:txBody>
+                  <a:tcPr marL="122405" marR="122405" marT="61203" marB="61203"/>
+                </a:tc>
+              </a:tr>
+              <a:tr h="470817">
+                <a:tc>
+                  <a:txBody>
+                    <a:bodyPr/>
+                    <a:lstStyle/>
+                    <a:p>
+                      <a:r>
+                        <a:rPr lang="en-US" sz="1600" b="0" dirty="0" smtClean="0">
+                          <a:solidFill>
+                            <a:schemeClr val="tx1"/>
+                          </a:solidFill>
+                        </a:rPr>
+                        <a:t>Jason Kidd</a:t>
+                      </a:r>
+                      <a:endParaRPr lang="en-US" sz="1600" b="0" dirty="0">
+                        <a:solidFill>
+                          <a:schemeClr val="tx1"/>
+                        </a:solidFill>
+                      </a:endParaRPr>
+                    </a:p>
+                  </a:txBody>
+                  <a:tcPr marL="122405" marR="122405" marT="61203" marB="61203"/>
+                </a:tc>
+                <a:tc>
+                  <a:txBody>
+                    <a:bodyPr/>
+                    <a:lstStyle/>
+                    <a:p>
+                      <a:pPr algn="ctr"/>
+                      <a:r>
+                        <a:rPr lang="en-US" sz="1600" b="0" dirty="0" smtClean="0">
+                          <a:solidFill>
+                            <a:schemeClr val="tx1"/>
+                          </a:solidFill>
+                        </a:rPr>
+                        <a:t>-55.968</a:t>
+                      </a:r>
+                      <a:endParaRPr lang="en-US" sz="1600" b="0" dirty="0">
+                        <a:solidFill>
+                          <a:schemeClr val="tx1"/>
+                        </a:solidFill>
+                      </a:endParaRPr>
+                    </a:p>
+                  </a:txBody>
+                  <a:tcPr marL="122405" marR="122405" marT="61203" marB="61203"/>
+                </a:tc>
+                <a:tc>
+                  <a:txBody>
+                    <a:bodyPr/>
+                    <a:lstStyle/>
+                    <a:p>
+                      <a:pPr algn="ctr"/>
+                      <a:r>
+                        <a:rPr lang="en-US" sz="1600" b="1" dirty="0" smtClean="0">
+                          <a:solidFill>
+                            <a:schemeClr val="tx1"/>
+                          </a:solidFill>
+                        </a:rPr>
+                        <a:t>0.205</a:t>
+                      </a:r>
+                      <a:endParaRPr lang="en-US" sz="1600" b="1" dirty="0">
+                        <a:solidFill>
+                          <a:schemeClr val="tx1"/>
+                        </a:solidFill>
+                      </a:endParaRPr>
+                    </a:p>
+                  </a:txBody>
+                  <a:tcPr marL="122405" marR="122405" marT="61203" marB="61203"/>
+                </a:tc>
+                <a:tc>
+                  <a:txBody>
+                    <a:bodyPr/>
+                    <a:lstStyle/>
+                    <a:p>
+                      <a:pPr algn="ctr"/>
+                      <a:r>
+                        <a:rPr lang="en-US" sz="1600" b="1" dirty="0" smtClean="0">
+                          <a:solidFill>
+                            <a:srgbClr val="FF0000"/>
+                          </a:solidFill>
+                        </a:rPr>
+                        <a:t>-2.996</a:t>
+                      </a:r>
+                      <a:endParaRPr lang="en-US" sz="1600" b="1" dirty="0">
+                        <a:solidFill>
+                          <a:srgbClr val="FF0000"/>
+                        </a:solidFill>
+                      </a:endParaRPr>
+                    </a:p>
+                  </a:txBody>
+                  <a:tcPr marL="122405" marR="122405" marT="61203" marB="61203"/>
+                </a:tc>
+                <a:tc>
+                  <a:txBody>
+                    <a:bodyPr/>
+                    <a:lstStyle/>
+                    <a:p>
+                      <a:pPr algn="ctr"/>
+                      <a:r>
+                        <a:rPr lang="en-US" sz="1600" b="0" dirty="0" smtClean="0">
+                          <a:solidFill>
+                            <a:schemeClr val="tx1"/>
+                          </a:solidFill>
+                        </a:rPr>
+                        <a:t>64.236</a:t>
+                      </a:r>
+                      <a:endParaRPr lang="en-US" sz="1600" b="0" dirty="0">
+                        <a:solidFill>
+                          <a:schemeClr val="tx1"/>
+                        </a:solidFill>
+                      </a:endParaRPr>
+                    </a:p>
+                  </a:txBody>
+                  <a:tcPr marL="122405" marR="122405" marT="61203" marB="61203"/>
+                </a:tc>
+                <a:tc>
+                  <a:txBody>
+                    <a:bodyPr/>
+                    <a:lstStyle/>
+                    <a:p>
+                      <a:pPr algn="ctr"/>
+                      <a:r>
+                        <a:rPr lang="en-US" sz="1600" b="1" dirty="0" smtClean="0">
+                          <a:solidFill>
+                            <a:schemeClr val="tx1"/>
+                          </a:solidFill>
+                        </a:rPr>
+                        <a:t>-0.261</a:t>
+                      </a:r>
+                      <a:endParaRPr lang="en-US" sz="1600" b="1" dirty="0">
+                        <a:solidFill>
+                          <a:schemeClr val="tx1"/>
+                        </a:solidFill>
+                      </a:endParaRPr>
+                    </a:p>
+                  </a:txBody>
+                  <a:tcPr marL="122405" marR="122405" marT="61203" marB="61203"/>
+                </a:tc>
+                <a:tc>
+                  <a:txBody>
+                    <a:bodyPr/>
+                    <a:lstStyle/>
+                    <a:p>
+                      <a:pPr algn="ctr"/>
+                      <a:r>
+                        <a:rPr lang="en-US" sz="1600" b="1" dirty="0" smtClean="0">
+                          <a:solidFill>
+                            <a:srgbClr val="FF0000"/>
+                          </a:solidFill>
+                        </a:rPr>
+                        <a:t>10.115</a:t>
+                      </a:r>
+                      <a:endParaRPr lang="en-US" sz="1600" b="1" dirty="0">
+                        <a:solidFill>
+                          <a:srgbClr val="FF0000"/>
+                        </a:solidFill>
+                      </a:endParaRPr>
+                    </a:p>
+                  </a:txBody>
+                  <a:tcPr marL="122405" marR="122405" marT="61203" marB="61203"/>
+                </a:tc>
+              </a:tr>
+              <a:tr h="470817">
+                <a:tc>
+                  <a:txBody>
+                    <a:bodyPr/>
+                    <a:lstStyle/>
+                    <a:p>
+                      <a:r>
+                        <a:rPr lang="en-US" sz="1600" b="0" dirty="0" smtClean="0">
+                          <a:solidFill>
+                            <a:schemeClr val="tx1"/>
+                          </a:solidFill>
+                        </a:rPr>
+                        <a:t>Dirk </a:t>
+                      </a:r>
+                      <a:r>
+                        <a:rPr lang="en-US" sz="1600" b="0" dirty="0" err="1" smtClean="0">
+                          <a:solidFill>
+                            <a:schemeClr val="tx1"/>
+                          </a:solidFill>
+                        </a:rPr>
+                        <a:t>Nowitzki</a:t>
+                      </a:r>
+                      <a:endParaRPr lang="en-US" sz="1600" b="0" dirty="0">
+                        <a:solidFill>
+                          <a:schemeClr val="tx1"/>
+                        </a:solidFill>
+                      </a:endParaRPr>
+                    </a:p>
+                  </a:txBody>
+                  <a:tcPr marL="122405" marR="122405" marT="61203" marB="61203"/>
+                </a:tc>
+                <a:tc>
+                  <a:txBody>
+                    <a:bodyPr/>
+                    <a:lstStyle/>
+                    <a:p>
+                      <a:pPr algn="ctr"/>
+                      <a:r>
+                        <a:rPr lang="en-US" sz="1600" b="0" dirty="0" smtClean="0">
+                          <a:solidFill>
+                            <a:schemeClr val="tx1"/>
+                          </a:solidFill>
+                        </a:rPr>
+                        <a:t>466.984</a:t>
+                      </a:r>
+                      <a:endParaRPr lang="en-US" sz="1600" b="0" dirty="0">
+                        <a:solidFill>
+                          <a:schemeClr val="tx1"/>
+                        </a:solidFill>
+                      </a:endParaRPr>
+                    </a:p>
+                  </a:txBody>
+                  <a:tcPr marL="122405" marR="122405" marT="61203" marB="61203"/>
+                </a:tc>
+                <a:tc>
+                  <a:txBody>
+                    <a:bodyPr/>
+                    <a:lstStyle/>
+                    <a:p>
+                      <a:pPr algn="ctr"/>
+                      <a:r>
+                        <a:rPr lang="en-US" sz="1600" b="0" dirty="0" smtClean="0">
+                          <a:solidFill>
+                            <a:schemeClr val="tx1"/>
+                          </a:solidFill>
+                        </a:rPr>
+                        <a:t>-</a:t>
+                      </a:r>
+                      <a:r>
+                        <a:rPr lang="en-US" sz="1600" b="1" dirty="0" smtClean="0">
+                          <a:solidFill>
+                            <a:srgbClr val="FF0000"/>
+                          </a:solidFill>
+                        </a:rPr>
+                        <a:t>0.482</a:t>
+                      </a:r>
+                      <a:endParaRPr lang="en-US" sz="1600" b="1" dirty="0">
+                        <a:solidFill>
+                          <a:srgbClr val="FF0000"/>
+                        </a:solidFill>
+                      </a:endParaRPr>
+                    </a:p>
+                  </a:txBody>
+                  <a:tcPr marL="122405" marR="122405" marT="61203" marB="61203"/>
+                </a:tc>
+                <a:tc>
+                  <a:txBody>
+                    <a:bodyPr/>
+                    <a:lstStyle/>
+                    <a:p>
+                      <a:pPr algn="ctr"/>
+                      <a:r>
+                        <a:rPr lang="en-US" sz="1600" b="1" dirty="0" smtClean="0">
+                          <a:solidFill>
+                            <a:schemeClr val="tx1"/>
+                          </a:solidFill>
+                        </a:rPr>
+                        <a:t>0.353</a:t>
+                      </a:r>
+                      <a:endParaRPr lang="en-US" sz="1600" b="1" dirty="0">
+                        <a:solidFill>
+                          <a:schemeClr val="tx1"/>
+                        </a:solidFill>
+                      </a:endParaRPr>
+                    </a:p>
+                  </a:txBody>
+                  <a:tcPr marL="122405" marR="122405" marT="61203" marB="61203"/>
+                </a:tc>
+                <a:tc>
+                  <a:txBody>
+                    <a:bodyPr/>
+                    <a:lstStyle/>
+                    <a:p>
+                      <a:pPr algn="ctr"/>
+                      <a:r>
+                        <a:rPr lang="en-US" sz="1600" b="0" dirty="0" smtClean="0">
+                          <a:solidFill>
+                            <a:schemeClr val="tx1"/>
+                          </a:solidFill>
+                        </a:rPr>
+                        <a:t>105.667</a:t>
+                      </a:r>
+                      <a:endParaRPr lang="en-US" sz="1600" b="0" dirty="0">
+                        <a:solidFill>
+                          <a:schemeClr val="tx1"/>
+                        </a:solidFill>
+                      </a:endParaRPr>
+                    </a:p>
+                  </a:txBody>
+                  <a:tcPr marL="122405" marR="122405" marT="61203" marB="61203"/>
+                </a:tc>
+                <a:tc>
+                  <a:txBody>
+                    <a:bodyPr/>
+                    <a:lstStyle/>
+                    <a:p>
+                      <a:pPr algn="ctr"/>
+                      <a:r>
+                        <a:rPr lang="en-US" sz="1600" b="1" dirty="0" smtClean="0">
+                          <a:solidFill>
+                            <a:srgbClr val="FF0000"/>
+                          </a:solidFill>
+                        </a:rPr>
+                        <a:t>0.398</a:t>
+                      </a:r>
+                      <a:endParaRPr lang="en-US" sz="1600" b="1" dirty="0">
+                        <a:solidFill>
+                          <a:srgbClr val="FF0000"/>
+                        </a:solidFill>
+                      </a:endParaRPr>
+                    </a:p>
+                  </a:txBody>
+                  <a:tcPr marL="122405" marR="122405" marT="61203" marB="61203"/>
+                </a:tc>
+                <a:tc>
+                  <a:txBody>
+                    <a:bodyPr/>
+                    <a:lstStyle/>
+                    <a:p>
+                      <a:pPr algn="ctr"/>
+                      <a:r>
+                        <a:rPr lang="en-US" sz="1600" b="1" dirty="0" smtClean="0">
+                          <a:solidFill>
+                            <a:schemeClr val="tx1"/>
+                          </a:solidFill>
+                        </a:rPr>
+                        <a:t>-6.913</a:t>
+                      </a:r>
+                      <a:endParaRPr lang="en-US" sz="1600" b="1" dirty="0">
+                        <a:solidFill>
+                          <a:schemeClr val="tx1"/>
+                        </a:solidFill>
+                      </a:endParaRPr>
+                    </a:p>
+                  </a:txBody>
+                  <a:tcPr marL="122405" marR="122405" marT="61203" marB="61203"/>
+                </a:tc>
+              </a:tr>
+              <a:tr h="470817">
+                <a:tc>
+                  <a:txBody>
+                    <a:bodyPr/>
+                    <a:lstStyle/>
+                    <a:p>
+                      <a:r>
+                        <a:rPr lang="en-US" sz="1600" b="0" dirty="0" smtClean="0">
+                          <a:solidFill>
+                            <a:schemeClr val="tx1"/>
+                          </a:solidFill>
+                        </a:rPr>
+                        <a:t>League Avg.</a:t>
+                      </a:r>
+                      <a:endParaRPr lang="en-US" sz="1600" b="0" dirty="0">
+                        <a:solidFill>
+                          <a:schemeClr val="tx1"/>
+                        </a:solidFill>
+                      </a:endParaRPr>
+                    </a:p>
+                  </a:txBody>
+                  <a:tcPr marL="122405" marR="122405" marT="61203" marB="61203"/>
+                </a:tc>
+                <a:tc>
+                  <a:txBody>
+                    <a:bodyPr/>
+                    <a:lstStyle/>
+                    <a:p>
+                      <a:pPr algn="ctr"/>
+                      <a:r>
+                        <a:rPr lang="en-US" sz="1600" b="0" dirty="0" smtClean="0">
+                          <a:solidFill>
+                            <a:schemeClr val="tx1"/>
+                          </a:solidFill>
+                        </a:rPr>
+                        <a:t>-0.197</a:t>
+                      </a:r>
+                      <a:endParaRPr lang="en-US" sz="1600" b="0" dirty="0">
+                        <a:solidFill>
+                          <a:schemeClr val="tx1"/>
+                        </a:solidFill>
+                      </a:endParaRPr>
+                    </a:p>
+                  </a:txBody>
+                  <a:tcPr marL="122405" marR="122405" marT="61203" marB="61203"/>
+                </a:tc>
+                <a:tc>
+                  <a:txBody>
+                    <a:bodyPr/>
+                    <a:lstStyle/>
+                    <a:p>
+                      <a:pPr algn="ctr"/>
+                      <a:r>
+                        <a:rPr lang="en-US" sz="1600" b="0" dirty="0" smtClean="0">
+                          <a:solidFill>
+                            <a:schemeClr val="tx1"/>
+                          </a:solidFill>
+                        </a:rPr>
+                        <a:t>-0.029</a:t>
+                      </a:r>
+                      <a:endParaRPr lang="en-US" sz="1600" b="0" dirty="0">
+                        <a:solidFill>
+                          <a:schemeClr val="tx1"/>
+                        </a:solidFill>
+                      </a:endParaRPr>
+                    </a:p>
+                  </a:txBody>
+                  <a:tcPr marL="122405" marR="122405" marT="61203" marB="61203"/>
+                </a:tc>
+                <a:tc>
+                  <a:txBody>
+                    <a:bodyPr/>
+                    <a:lstStyle/>
+                    <a:p>
+                      <a:pPr algn="ctr"/>
+                      <a:r>
+                        <a:rPr lang="en-US" sz="1600" b="0" dirty="0" smtClean="0">
+                          <a:solidFill>
+                            <a:schemeClr val="tx1"/>
+                          </a:solidFill>
+                        </a:rPr>
+                        <a:t>-0.137</a:t>
+                      </a:r>
+                      <a:endParaRPr lang="en-US" sz="1600" b="0" dirty="0">
+                        <a:solidFill>
+                          <a:schemeClr val="tx1"/>
+                        </a:solidFill>
+                      </a:endParaRPr>
+                    </a:p>
+                  </a:txBody>
+                  <a:tcPr marL="122405" marR="122405" marT="61203" marB="61203"/>
+                </a:tc>
+                <a:tc>
+                  <a:txBody>
+                    <a:bodyPr/>
+                    <a:lstStyle/>
+                    <a:p>
+                      <a:pPr algn="ctr"/>
+                      <a:r>
+                        <a:rPr lang="en-US" sz="1600" b="0" dirty="0" smtClean="0">
+                          <a:solidFill>
+                            <a:schemeClr val="tx1"/>
+                          </a:solidFill>
+                        </a:rPr>
+                        <a:t>-0.197</a:t>
+                      </a:r>
+                      <a:endParaRPr lang="en-US" sz="1600" b="0" dirty="0">
+                        <a:solidFill>
+                          <a:schemeClr val="tx1"/>
+                        </a:solidFill>
+                      </a:endParaRPr>
+                    </a:p>
+                  </a:txBody>
+                  <a:tcPr marL="122405" marR="122405" marT="61203" marB="61203"/>
+                </a:tc>
+                <a:tc>
+                  <a:txBody>
+                    <a:bodyPr/>
+                    <a:lstStyle/>
+                    <a:p>
+                      <a:pPr algn="ctr"/>
+                      <a:r>
+                        <a:rPr lang="en-US" sz="1600" b="0" dirty="0" smtClean="0">
+                          <a:solidFill>
+                            <a:schemeClr val="tx1"/>
+                          </a:solidFill>
+                        </a:rPr>
+                        <a:t>-0.029</a:t>
+                      </a:r>
+                      <a:endParaRPr lang="en-US" sz="1600" b="0" dirty="0">
+                        <a:solidFill>
+                          <a:schemeClr val="tx1"/>
+                        </a:solidFill>
+                      </a:endParaRPr>
+                    </a:p>
+                  </a:txBody>
+                  <a:tcPr marL="122405" marR="122405" marT="61203" marB="61203"/>
+                </a:tc>
+                <a:tc>
+                  <a:txBody>
+                    <a:bodyPr/>
+                    <a:lstStyle/>
+                    <a:p>
+                      <a:pPr algn="ctr"/>
+                      <a:r>
+                        <a:rPr lang="en-US" sz="1600" b="0" dirty="0" smtClean="0">
+                          <a:solidFill>
+                            <a:schemeClr val="tx1"/>
+                          </a:solidFill>
+                        </a:rPr>
+                        <a:t>-0.137</a:t>
+                      </a:r>
+                      <a:endParaRPr lang="en-US" sz="1600" b="0" dirty="0">
+                        <a:solidFill>
+                          <a:schemeClr val="tx1"/>
+                        </a:solidFill>
+                      </a:endParaRPr>
+                    </a:p>
+                  </a:txBody>
+                  <a:tcPr marL="122405" marR="122405" marT="61203" marB="61203"/>
+                </a:tc>
+              </a:tr>
+            </a:tbl>
+          </a:graphicData>
+        </a:graphic>
+      </p:graphicFrame>
+      <p:sp>
+        <p:nvSpPr>
+          <p:cNvPr id="25" name="Title 3"/>
+          <p:cNvSpPr>
+            <a:spLocks noGrp="1"/>
+          </p:cNvSpPr>
+          <p:nvPr>
+            <p:ph type="title"/>
+          </p:nvPr>
+        </p:nvSpPr>
+        <p:spPr>
+          <a:xfrm>
+            <a:off x="457199" y="235692"/>
+            <a:ext cx="7388352" cy="1143000"/>
+          </a:xfrm>
+        </p:spPr>
+        <p:txBody>
+          <a:bodyPr/>
+          <a:lstStyle/>
+          <a:p>
+            <a:r>
+              <a:rPr lang="en-US" b="1" dirty="0" smtClean="0"/>
+              <a:t>Case </a:t>
+            </a:r>
+            <a:r>
+              <a:rPr lang="en-US" b="1" dirty="0" smtClean="0"/>
+              <a:t>Study: Dallas Mavericks</a:t>
+            </a:r>
+            <a:endParaRPr lang="en-US" b="1" dirty="0"/>
+          </a:p>
+        </p:txBody>
+      </p:sp>
+      <p:sp>
+        <p:nvSpPr>
+          <p:cNvPr id="19" name="TextBox 18"/>
+          <p:cNvSpPr txBox="1"/>
+          <p:nvPr/>
+        </p:nvSpPr>
+        <p:spPr>
+          <a:xfrm>
+            <a:off x="336389" y="5302542"/>
+            <a:ext cx="3233510" cy="307777"/>
+          </a:xfrm>
+          <a:prstGeom prst="rect">
+            <a:avLst/>
+          </a:prstGeom>
+          <a:noFill/>
+        </p:spPr>
+        <p:txBody>
+          <a:bodyPr wrap="none" rtlCol="0">
+            <a:spAutoFit/>
+          </a:bodyPr>
+          <a:lstStyle/>
+          <a:p>
+            <a:r>
+              <a:rPr lang="en-US" sz="1400" dirty="0" smtClean="0"/>
+              <a:t>35 games; 3152 1</a:t>
+            </a:r>
+            <a:r>
+              <a:rPr lang="en-US" sz="1400" baseline="30000" dirty="0" smtClean="0"/>
+              <a:t>st</a:t>
+            </a:r>
+            <a:r>
+              <a:rPr lang="en-US" sz="1400" dirty="0" smtClean="0"/>
+              <a:t> half </a:t>
+            </a:r>
+            <a:r>
+              <a:rPr lang="en-US" sz="1400" dirty="0" smtClean="0"/>
+              <a:t>possessions</a:t>
+            </a:r>
+            <a:r>
+              <a:rPr lang="en-US" sz="1400" dirty="0" smtClean="0"/>
+              <a:t>*</a:t>
+            </a:r>
+            <a:endParaRPr lang="en-US" sz="1400" dirty="0"/>
+          </a:p>
+        </p:txBody>
+      </p:sp>
+      <p:sp>
+        <p:nvSpPr>
+          <p:cNvPr id="20" name="Rectangle 19"/>
+          <p:cNvSpPr/>
+          <p:nvPr/>
+        </p:nvSpPr>
+        <p:spPr>
+          <a:xfrm>
+            <a:off x="336389" y="4779322"/>
+            <a:ext cx="4572000" cy="523220"/>
+          </a:xfrm>
+          <a:prstGeom prst="rect">
+            <a:avLst/>
+          </a:prstGeom>
+        </p:spPr>
+        <p:txBody>
+          <a:bodyPr>
+            <a:spAutoFit/>
+          </a:bodyPr>
+          <a:lstStyle/>
+          <a:p>
+            <a:r>
+              <a:rPr lang="en-US" sz="1400" dirty="0" smtClean="0"/>
+              <a:t>Offensive Skills: Higher the better</a:t>
+            </a:r>
+          </a:p>
+          <a:p>
+            <a:r>
+              <a:rPr lang="en-US" sz="1400" dirty="0" smtClean="0"/>
+              <a:t>Defensive Skills: Lower the better</a:t>
+            </a:r>
+            <a:endParaRPr lang="en-US" sz="1400" dirty="0"/>
+          </a:p>
+        </p:txBody>
+      </p:sp>
+    </p:spTree>
+  </p:cSld>
+  <p:clrMapOvr>
+    <a:masterClrMapping/>
+  </p:clrMapOvr>
+</p:sld>
+</file>
+
+<file path=ppt/slides/slide8.xml><?xml version="1.0" encoding="utf-8"?>
+<p:sld xmlns:a="http://schemas.openxmlformats.org/drawingml/2006/main" xmlns:r="http://schemas.openxmlformats.org/officeDocument/2006/relationships" xmlns:mc="http://schemas.openxmlformats.org/markup-compatibility/2006" xmlns:mv="urn:schemas-microsoft-com:mac:vml" xmlns:p="http://schemas.openxmlformats.org/presentationml/2006/main" mc:Ignorable="mv" mc:PreserveAttributes="mv:*">
+  <p:cSld>
+    <p:spTree>
+      <p:nvGrpSpPr>
+        <p:cNvPr id="1" name=""/>
+        <p:cNvGrpSpPr/>
+        <p:nvPr/>
+      </p:nvGrpSpPr>
+      <p:grpSpPr>
+        <a:xfrm>
+          <a:off x="0" y="0"/>
+          <a:ext cx="0" cy="0"/>
+          <a:chOff x="0" y="0"/>
+          <a:chExt cx="0" cy="0"/>
+        </a:xfrm>
+      </p:grpSpPr>
+      <p:sp>
+        <p:nvSpPr>
+          <p:cNvPr id="5" name="Text Placeholder 4"/>
+          <p:cNvSpPr>
+            <a:spLocks noGrp="1"/>
+          </p:cNvSpPr>
+          <p:nvPr>
+            <p:ph type="body" idx="1"/>
+          </p:nvPr>
+        </p:nvSpPr>
+        <p:spPr>
+          <a:xfrm>
+            <a:off x="457202" y="528143"/>
+            <a:ext cx="4040188" cy="639762"/>
+          </a:xfrm>
+        </p:spPr>
+        <p:txBody>
+          <a:bodyPr/>
+          <a:lstStyle/>
+          <a:p>
+            <a:r>
+              <a:rPr lang="en-US" sz="2400" dirty="0" smtClean="0"/>
+              <a:t>Future Work</a:t>
+            </a:r>
+            <a:endParaRPr lang="en-US" sz="2400" dirty="0"/>
+          </a:p>
+        </p:txBody>
+      </p:sp>
+      <p:sp>
+        <p:nvSpPr>
+          <p:cNvPr id="6" name="Content Placeholder 5"/>
+          <p:cNvSpPr>
+            <a:spLocks noGrp="1"/>
+          </p:cNvSpPr>
+          <p:nvPr>
+            <p:ph sz="half" idx="2"/>
+          </p:nvPr>
+        </p:nvSpPr>
+        <p:spPr>
+          <a:xfrm>
+            <a:off x="457202" y="1167906"/>
+            <a:ext cx="4040188" cy="4958258"/>
+          </a:xfrm>
+        </p:spPr>
+        <p:txBody>
+          <a:bodyPr>
+            <a:normAutofit/>
+          </a:bodyPr>
+          <a:lstStyle/>
+          <a:p>
+            <a:r>
+              <a:rPr lang="en-US" dirty="0" smtClean="0"/>
+              <a:t>Smoothing/Bayesian Prior</a:t>
+            </a:r>
+          </a:p>
+          <a:p>
+            <a:r>
+              <a:rPr lang="en-US" dirty="0" smtClean="0"/>
+              <a:t>Coach Skill</a:t>
+            </a:r>
+          </a:p>
+          <a:p>
+            <a:r>
+              <a:rPr lang="en-US" dirty="0" smtClean="0"/>
+              <a:t>Even More Data</a:t>
+            </a:r>
+          </a:p>
+          <a:p>
+            <a:pPr>
+              <a:buNone/>
+            </a:pPr>
+            <a:endParaRPr lang="en-US" dirty="0" smtClean="0"/>
+          </a:p>
+          <a:p>
+            <a:endParaRPr lang="en-US" dirty="0" smtClean="0"/>
+          </a:p>
+        </p:txBody>
+      </p:sp>
+      <p:sp>
+        <p:nvSpPr>
+          <p:cNvPr id="7" name="Text Placeholder 6"/>
+          <p:cNvSpPr>
+            <a:spLocks noGrp="1"/>
+          </p:cNvSpPr>
+          <p:nvPr>
+            <p:ph type="body" sz="quarter" idx="3"/>
+          </p:nvPr>
+        </p:nvSpPr>
+        <p:spPr>
+          <a:xfrm>
+            <a:off x="4645027" y="528143"/>
+            <a:ext cx="4041775" cy="639762"/>
+          </a:xfrm>
+        </p:spPr>
+        <p:txBody>
+          <a:bodyPr/>
+          <a:lstStyle/>
+          <a:p>
+            <a:r>
+              <a:rPr lang="en-US" sz="2400" dirty="0" smtClean="0"/>
+              <a:t>Conclusion</a:t>
+            </a:r>
+            <a:endParaRPr lang="en-US" sz="2400" dirty="0"/>
+          </a:p>
+        </p:txBody>
+      </p:sp>
+      <p:sp>
+        <p:nvSpPr>
+          <p:cNvPr id="8" name="Content Placeholder 7"/>
+          <p:cNvSpPr>
+            <a:spLocks noGrp="1"/>
+          </p:cNvSpPr>
+          <p:nvPr>
+            <p:ph sz="quarter" idx="4"/>
+          </p:nvPr>
+        </p:nvSpPr>
+        <p:spPr>
+          <a:xfrm>
+            <a:off x="4645027" y="1167907"/>
+            <a:ext cx="3555079" cy="3227114"/>
+          </a:xfrm>
+        </p:spPr>
+        <p:txBody>
+          <a:bodyPr>
+            <a:normAutofit/>
+          </a:bodyPr>
+          <a:lstStyle/>
+          <a:p>
+            <a:r>
+              <a:rPr lang="en-US" dirty="0" smtClean="0"/>
+              <a:t>New way to rank players based on individual contributions</a:t>
+            </a:r>
+            <a:endParaRPr lang="en-US" dirty="0" smtClean="0"/>
+          </a:p>
+          <a:p>
+            <a:endParaRPr lang="en-US" dirty="0" smtClean="0"/>
+          </a:p>
+        </p:txBody>
+      </p:sp>
+      <p:sp>
+        <p:nvSpPr>
+          <p:cNvPr id="9" name="Text Placeholder 6"/>
+          <p:cNvSpPr txBox="1">
+            <a:spLocks/>
+          </p:cNvSpPr>
+          <p:nvPr/>
+        </p:nvSpPr>
+        <p:spPr>
+          <a:xfrm>
+            <a:off x="4659125" y="4151243"/>
+            <a:ext cx="4041775" cy="639762"/>
+          </a:xfrm>
+          <a:prstGeom prst="rect">
+            <a:avLst/>
+          </a:prstGeom>
+        </p:spPr>
+        <p:txBody>
+          <a:bodyPr vert="horz" lIns="91440" tIns="45720" rIns="91440" bIns="45720" rtlCol="0" anchor="b">
+            <a:noAutofit/>
+          </a:bodyPr>
+          <a:lstStyle/>
+          <a:p>
+            <a:pPr marL="0" marR="0" lvl="0" indent="0" algn="ctr" defTabSz="914400" rtl="0" eaLnBrk="1" fontAlgn="auto" latinLnBrk="0" hangingPunct="1">
+              <a:lnSpc>
+                <a:spcPct val="100000"/>
+              </a:lnSpc>
+              <a:spcBef>
+                <a:spcPct val="0"/>
+              </a:spcBef>
+              <a:spcAft>
+                <a:spcPts val="0"/>
+              </a:spcAft>
+              <a:buClr>
+                <a:schemeClr val="accent1"/>
+              </a:buClr>
+              <a:buSzPct val="100000"/>
+              <a:buFont typeface="Wingdings 2" pitchFamily="18" charset="2"/>
+              <a:buNone/>
+              <a:tabLst/>
+              <a:defRPr/>
+            </a:pPr>
+            <a:endParaRPr kumimoji="0" lang="en-US" sz="2000" b="1" i="0" u="none" strike="noStrike" kern="1200" cap="none" spc="0" normalizeH="0" baseline="0" noProof="0" dirty="0">
+              <a:ln>
+                <a:noFill/>
+              </a:ln>
+              <a:solidFill>
+                <a:schemeClr val="accent1"/>
+              </a:solidFill>
+              <a:effectLst/>
+              <a:uLnTx/>
+              <a:uFillTx/>
+              <a:latin typeface="+mn-lt"/>
+              <a:ea typeface="+mn-ea"/>
+              <a:cs typeface="+mn-cs"/>
+            </a:endParaRPr>
+          </a:p>
+        </p:txBody>
+      </p:sp>
+      <p:sp>
+        <p:nvSpPr>
+          <p:cNvPr id="10" name="Content Placeholder 7"/>
+          <p:cNvSpPr txBox="1">
+            <a:spLocks/>
+          </p:cNvSpPr>
+          <p:nvPr/>
+        </p:nvSpPr>
+        <p:spPr>
+          <a:xfrm>
+            <a:off x="4659125" y="4791006"/>
+            <a:ext cx="4041775" cy="1384786"/>
+          </a:xfrm>
+          <a:prstGeom prst="rect">
+            <a:avLst/>
+          </a:prstGeom>
+        </p:spPr>
+        <p:txBody>
+          <a:bodyPr vert="horz" lIns="91440" tIns="45720" rIns="91440" bIns="45720" rtlCol="0">
+            <a:normAutofit/>
+          </a:bodyPr>
+          <a:lstStyle/>
+          <a:p>
+            <a:pPr marL="228600" marR="0" lvl="0" indent="-228600" algn="l" defTabSz="914400" rtl="0" eaLnBrk="1" fontAlgn="auto" latinLnBrk="0" hangingPunct="1">
+              <a:lnSpc>
+                <a:spcPct val="100000"/>
+              </a:lnSpc>
+              <a:spcBef>
+                <a:spcPts val="1800"/>
+              </a:spcBef>
+              <a:spcAft>
+                <a:spcPts val="0"/>
+              </a:spcAft>
+              <a:buClr>
+                <a:schemeClr val="accent1"/>
+              </a:buClr>
+              <a:buSzPct val="100000"/>
+              <a:buFont typeface="Wingdings 2" pitchFamily="18" charset="2"/>
+              <a:buChar char="¡"/>
+              <a:tabLst/>
+              <a:defRPr/>
+            </a:pPr>
+            <a:endParaRPr kumimoji="0" lang="en-US" sz="1800" b="0" i="0" u="none" strike="noStrike" kern="1200" cap="none" spc="0" normalizeH="0" baseline="0" noProof="0" dirty="0" smtClean="0">
+              <a:ln>
+                <a:noFill/>
+              </a:ln>
+              <a:solidFill>
+                <a:schemeClr val="tx2"/>
+              </a:solidFill>
+              <a:effectLst/>
+              <a:uLnTx/>
+              <a:uFillTx/>
+              <a:latin typeface="+mn-lt"/>
+              <a:ea typeface="+mn-ea"/>
+              <a:cs typeface="+mn-cs"/>
+            </a:endParaRPr>
           </a:p>
         </p:txBody>
       </p:sp>

</xml_diff>